<commit_message>
move hw2 to later date
</commit_message>
<xml_diff>
--- a/resources/hw/genomic-data-visualization-HW_2.pptx
+++ b/resources/hw/genomic-data-visualization-HW_2.pptx
@@ -246,7 +246,7 @@
           <a:p>
             <a:fld id="{1FA6669D-5A44-F242-9DC1-2E1CBC5487EB}" type="datetimeFigureOut">
               <a:rPr lang="en-US" smtClean="0"/>
-              <a:t>1/19/24</a:t>
+              <a:t>1/28/24</a:t>
             </a:fld>
             <a:endParaRPr lang="en-US"/>
           </a:p>
@@ -416,7 +416,7 @@
           <a:p>
             <a:fld id="{1FA6669D-5A44-F242-9DC1-2E1CBC5487EB}" type="datetimeFigureOut">
               <a:rPr lang="en-US" smtClean="0"/>
-              <a:t>1/19/24</a:t>
+              <a:t>1/28/24</a:t>
             </a:fld>
             <a:endParaRPr lang="en-US"/>
           </a:p>
@@ -596,7 +596,7 @@
           <a:p>
             <a:fld id="{1FA6669D-5A44-F242-9DC1-2E1CBC5487EB}" type="datetimeFigureOut">
               <a:rPr lang="en-US" smtClean="0"/>
-              <a:t>1/19/24</a:t>
+              <a:t>1/28/24</a:t>
             </a:fld>
             <a:endParaRPr lang="en-US"/>
           </a:p>
@@ -766,7 +766,7 @@
           <a:p>
             <a:fld id="{1FA6669D-5A44-F242-9DC1-2E1CBC5487EB}" type="datetimeFigureOut">
               <a:rPr lang="en-US" smtClean="0"/>
-              <a:t>1/19/24</a:t>
+              <a:t>1/28/24</a:t>
             </a:fld>
             <a:endParaRPr lang="en-US"/>
           </a:p>
@@ -1012,7 +1012,7 @@
           <a:p>
             <a:fld id="{1FA6669D-5A44-F242-9DC1-2E1CBC5487EB}" type="datetimeFigureOut">
               <a:rPr lang="en-US" smtClean="0"/>
-              <a:t>1/19/24</a:t>
+              <a:t>1/28/24</a:t>
             </a:fld>
             <a:endParaRPr lang="en-US"/>
           </a:p>
@@ -1244,7 +1244,7 @@
           <a:p>
             <a:fld id="{1FA6669D-5A44-F242-9DC1-2E1CBC5487EB}" type="datetimeFigureOut">
               <a:rPr lang="en-US" smtClean="0"/>
-              <a:t>1/19/24</a:t>
+              <a:t>1/28/24</a:t>
             </a:fld>
             <a:endParaRPr lang="en-US"/>
           </a:p>
@@ -1611,7 +1611,7 @@
           <a:p>
             <a:fld id="{1FA6669D-5A44-F242-9DC1-2E1CBC5487EB}" type="datetimeFigureOut">
               <a:rPr lang="en-US" smtClean="0"/>
-              <a:t>1/19/24</a:t>
+              <a:t>1/28/24</a:t>
             </a:fld>
             <a:endParaRPr lang="en-US"/>
           </a:p>
@@ -1729,7 +1729,7 @@
           <a:p>
             <a:fld id="{1FA6669D-5A44-F242-9DC1-2E1CBC5487EB}" type="datetimeFigureOut">
               <a:rPr lang="en-US" smtClean="0"/>
-              <a:t>1/19/24</a:t>
+              <a:t>1/28/24</a:t>
             </a:fld>
             <a:endParaRPr lang="en-US"/>
           </a:p>
@@ -1824,7 +1824,7 @@
           <a:p>
             <a:fld id="{1FA6669D-5A44-F242-9DC1-2E1CBC5487EB}" type="datetimeFigureOut">
               <a:rPr lang="en-US" smtClean="0"/>
-              <a:t>1/19/24</a:t>
+              <a:t>1/28/24</a:t>
             </a:fld>
             <a:endParaRPr lang="en-US"/>
           </a:p>
@@ -2101,7 +2101,7 @@
           <a:p>
             <a:fld id="{1FA6669D-5A44-F242-9DC1-2E1CBC5487EB}" type="datetimeFigureOut">
               <a:rPr lang="en-US" smtClean="0"/>
-              <a:t>1/19/24</a:t>
+              <a:t>1/28/24</a:t>
             </a:fld>
             <a:endParaRPr lang="en-US"/>
           </a:p>
@@ -2358,7 +2358,7 @@
           <a:p>
             <a:fld id="{1FA6669D-5A44-F242-9DC1-2E1CBC5487EB}" type="datetimeFigureOut">
               <a:rPr lang="en-US" smtClean="0"/>
-              <a:t>1/19/24</a:t>
+              <a:t>1/28/24</a:t>
             </a:fld>
             <a:endParaRPr lang="en-US"/>
           </a:p>
@@ -2571,7 +2571,7 @@
           <a:p>
             <a:fld id="{1FA6669D-5A44-F242-9DC1-2E1CBC5487EB}" type="datetimeFigureOut">
               <a:rPr lang="en-US" smtClean="0"/>
-              <a:t>1/19/24</a:t>
+              <a:t>1/28/24</a:t>
             </a:fld>
             <a:endParaRPr lang="en-US"/>
           </a:p>
@@ -3027,7 +3027,7 @@
           <a:p>
             <a:r>
               <a:rPr lang="en-US" dirty="0"/>
-              <a:t>Due Wednesday (Midnight Baltimore Time)</a:t>
+              <a:t>Due Thursday (Midnight Baltimore Time)</a:t>
             </a:r>
           </a:p>
         </p:txBody>
@@ -3113,7 +3113,7 @@
           <a:p>
             <a:r>
               <a:rPr lang="en-US" dirty="0"/>
-              <a:t>Choose a teammate and apply their code to your data</a:t>
+              <a:t>Choose another classmate’s data visualization from the class website. Apply their code to your data.</a:t>
             </a:r>
           </a:p>
           <a:p>

</xml_diff>